<commit_message>
Updated HeuristicLab 3.3 architecture diagram
git-svn-id: https://src.heuristiclab.com/svn/core/trunk@7763 2abd9481-f8db-48e9-bd25-06bc13291c1b
</commit_message>
<xml_diff>
--- a/documentation/HeuristicLab 3.3 - Architecture.pptx
+++ b/documentation/HeuristicLab 3.3 - Architecture.pptx
@@ -288,7 +288,7 @@
           <a:p>
             <a:fld id="{17A770FE-B93C-406E-B648-E21175039D10}" type="datetimeFigureOut">
               <a:rPr lang="de-AT" smtClean="0"/>
-              <a:t>11.04.2012</a:t>
+              <a:t>28.04.2012</a:t>
             </a:fld>
             <a:endParaRPr lang="de-AT"/>
           </a:p>
@@ -330,7 +330,7 @@
           <a:p>
             <a:fld id="{8D9144EB-E929-4A40-B56C-0BAF6B5B0A8F}" type="slidenum">
               <a:rPr lang="de-AT" smtClean="0"/>
-              <a:t>‹Nr.›</a:t>
+              <a:t>‹#›</a:t>
             </a:fld>
             <a:endParaRPr lang="de-AT"/>
           </a:p>
@@ -458,7 +458,7 @@
           <a:p>
             <a:fld id="{17A770FE-B93C-406E-B648-E21175039D10}" type="datetimeFigureOut">
               <a:rPr lang="de-AT" smtClean="0"/>
-              <a:t>11.04.2012</a:t>
+              <a:t>28.04.2012</a:t>
             </a:fld>
             <a:endParaRPr lang="de-AT"/>
           </a:p>
@@ -500,7 +500,7 @@
           <a:p>
             <a:fld id="{8D9144EB-E929-4A40-B56C-0BAF6B5B0A8F}" type="slidenum">
               <a:rPr lang="de-AT" smtClean="0"/>
-              <a:t>‹Nr.›</a:t>
+              <a:t>‹#›</a:t>
             </a:fld>
             <a:endParaRPr lang="de-AT"/>
           </a:p>
@@ -638,7 +638,7 @@
           <a:p>
             <a:fld id="{17A770FE-B93C-406E-B648-E21175039D10}" type="datetimeFigureOut">
               <a:rPr lang="de-AT" smtClean="0"/>
-              <a:t>11.04.2012</a:t>
+              <a:t>28.04.2012</a:t>
             </a:fld>
             <a:endParaRPr lang="de-AT"/>
           </a:p>
@@ -680,7 +680,7 @@
           <a:p>
             <a:fld id="{8D9144EB-E929-4A40-B56C-0BAF6B5B0A8F}" type="slidenum">
               <a:rPr lang="de-AT" smtClean="0"/>
-              <a:t>‹Nr.›</a:t>
+              <a:t>‹#›</a:t>
             </a:fld>
             <a:endParaRPr lang="de-AT"/>
           </a:p>
@@ -808,7 +808,7 @@
           <a:p>
             <a:fld id="{17A770FE-B93C-406E-B648-E21175039D10}" type="datetimeFigureOut">
               <a:rPr lang="de-AT" smtClean="0"/>
-              <a:t>11.04.2012</a:t>
+              <a:t>28.04.2012</a:t>
             </a:fld>
             <a:endParaRPr lang="de-AT"/>
           </a:p>
@@ -850,7 +850,7 @@
           <a:p>
             <a:fld id="{8D9144EB-E929-4A40-B56C-0BAF6B5B0A8F}" type="slidenum">
               <a:rPr lang="de-AT" smtClean="0"/>
-              <a:t>‹Nr.›</a:t>
+              <a:t>‹#›</a:t>
             </a:fld>
             <a:endParaRPr lang="de-AT"/>
           </a:p>
@@ -1054,7 +1054,7 @@
           <a:p>
             <a:fld id="{17A770FE-B93C-406E-B648-E21175039D10}" type="datetimeFigureOut">
               <a:rPr lang="de-AT" smtClean="0"/>
-              <a:t>11.04.2012</a:t>
+              <a:t>28.04.2012</a:t>
             </a:fld>
             <a:endParaRPr lang="de-AT"/>
           </a:p>
@@ -1096,7 +1096,7 @@
           <a:p>
             <a:fld id="{8D9144EB-E929-4A40-B56C-0BAF6B5B0A8F}" type="slidenum">
               <a:rPr lang="de-AT" smtClean="0"/>
-              <a:t>‹Nr.›</a:t>
+              <a:t>‹#›</a:t>
             </a:fld>
             <a:endParaRPr lang="de-AT"/>
           </a:p>
@@ -1342,7 +1342,7 @@
           <a:p>
             <a:fld id="{17A770FE-B93C-406E-B648-E21175039D10}" type="datetimeFigureOut">
               <a:rPr lang="de-AT" smtClean="0"/>
-              <a:t>11.04.2012</a:t>
+              <a:t>28.04.2012</a:t>
             </a:fld>
             <a:endParaRPr lang="de-AT"/>
           </a:p>
@@ -1384,7 +1384,7 @@
           <a:p>
             <a:fld id="{8D9144EB-E929-4A40-B56C-0BAF6B5B0A8F}" type="slidenum">
               <a:rPr lang="de-AT" smtClean="0"/>
-              <a:t>‹Nr.›</a:t>
+              <a:t>‹#›</a:t>
             </a:fld>
             <a:endParaRPr lang="de-AT"/>
           </a:p>
@@ -1769,7 +1769,7 @@
           <a:p>
             <a:fld id="{17A770FE-B93C-406E-B648-E21175039D10}" type="datetimeFigureOut">
               <a:rPr lang="de-AT" smtClean="0"/>
-              <a:t>11.04.2012</a:t>
+              <a:t>28.04.2012</a:t>
             </a:fld>
             <a:endParaRPr lang="de-AT"/>
           </a:p>
@@ -1811,7 +1811,7 @@
           <a:p>
             <a:fld id="{8D9144EB-E929-4A40-B56C-0BAF6B5B0A8F}" type="slidenum">
               <a:rPr lang="de-AT" smtClean="0"/>
-              <a:t>‹Nr.›</a:t>
+              <a:t>‹#›</a:t>
             </a:fld>
             <a:endParaRPr lang="de-AT"/>
           </a:p>
@@ -1887,7 +1887,7 @@
           <a:p>
             <a:fld id="{17A770FE-B93C-406E-B648-E21175039D10}" type="datetimeFigureOut">
               <a:rPr lang="de-AT" smtClean="0"/>
-              <a:t>11.04.2012</a:t>
+              <a:t>28.04.2012</a:t>
             </a:fld>
             <a:endParaRPr lang="de-AT"/>
           </a:p>
@@ -1929,7 +1929,7 @@
           <a:p>
             <a:fld id="{8D9144EB-E929-4A40-B56C-0BAF6B5B0A8F}" type="slidenum">
               <a:rPr lang="de-AT" smtClean="0"/>
-              <a:t>‹Nr.›</a:t>
+              <a:t>‹#›</a:t>
             </a:fld>
             <a:endParaRPr lang="de-AT"/>
           </a:p>
@@ -1982,7 +1982,7 @@
           <a:p>
             <a:fld id="{17A770FE-B93C-406E-B648-E21175039D10}" type="datetimeFigureOut">
               <a:rPr lang="de-AT" smtClean="0"/>
-              <a:t>11.04.2012</a:t>
+              <a:t>28.04.2012</a:t>
             </a:fld>
             <a:endParaRPr lang="de-AT"/>
           </a:p>
@@ -2024,7 +2024,7 @@
           <a:p>
             <a:fld id="{8D9144EB-E929-4A40-B56C-0BAF6B5B0A8F}" type="slidenum">
               <a:rPr lang="de-AT" smtClean="0"/>
-              <a:t>‹Nr.›</a:t>
+              <a:t>‹#›</a:t>
             </a:fld>
             <a:endParaRPr lang="de-AT"/>
           </a:p>
@@ -2259,7 +2259,7 @@
           <a:p>
             <a:fld id="{17A770FE-B93C-406E-B648-E21175039D10}" type="datetimeFigureOut">
               <a:rPr lang="de-AT" smtClean="0"/>
-              <a:t>11.04.2012</a:t>
+              <a:t>28.04.2012</a:t>
             </a:fld>
             <a:endParaRPr lang="de-AT"/>
           </a:p>
@@ -2301,7 +2301,7 @@
           <a:p>
             <a:fld id="{8D9144EB-E929-4A40-B56C-0BAF6B5B0A8F}" type="slidenum">
               <a:rPr lang="de-AT" smtClean="0"/>
-              <a:t>‹Nr.›</a:t>
+              <a:t>‹#›</a:t>
             </a:fld>
             <a:endParaRPr lang="de-AT"/>
           </a:p>
@@ -2512,7 +2512,7 @@
           <a:p>
             <a:fld id="{17A770FE-B93C-406E-B648-E21175039D10}" type="datetimeFigureOut">
               <a:rPr lang="de-AT" smtClean="0"/>
-              <a:t>11.04.2012</a:t>
+              <a:t>28.04.2012</a:t>
             </a:fld>
             <a:endParaRPr lang="de-AT"/>
           </a:p>
@@ -2554,7 +2554,7 @@
           <a:p>
             <a:fld id="{8D9144EB-E929-4A40-B56C-0BAF6B5B0A8F}" type="slidenum">
               <a:rPr lang="de-AT" smtClean="0"/>
-              <a:t>‹Nr.›</a:t>
+              <a:t>‹#›</a:t>
             </a:fld>
             <a:endParaRPr lang="de-AT"/>
           </a:p>
@@ -2725,7 +2725,7 @@
           <a:p>
             <a:fld id="{17A770FE-B93C-406E-B648-E21175039D10}" type="datetimeFigureOut">
               <a:rPr lang="de-AT" smtClean="0"/>
-              <a:t>11.04.2012</a:t>
+              <a:t>28.04.2012</a:t>
             </a:fld>
             <a:endParaRPr lang="de-AT"/>
           </a:p>
@@ -2803,7 +2803,7 @@
           <a:p>
             <a:fld id="{8D9144EB-E929-4A40-B56C-0BAF6B5B0A8F}" type="slidenum">
               <a:rPr lang="de-AT" smtClean="0"/>
-              <a:t>‹Nr.›</a:t>
+              <a:t>‹#›</a:t>
             </a:fld>
             <a:endParaRPr lang="de-AT"/>
           </a:p>
@@ -3108,7 +3108,7 @@
         </p:nvSpPr>
         <p:spPr>
           <a:xfrm>
-            <a:off x="3204443" y="3377539"/>
+            <a:off x="3204443" y="3355933"/>
             <a:ext cx="1656184" cy="331237"/>
           </a:xfrm>
           <a:prstGeom prst="rect">
@@ -3138,14 +3138,12 @@
             <a:pPr algn="ctr"/>
             <a:r>
               <a:rPr lang="de-AT" sz="1400" dirty="0" smtClean="0">
-                <a:latin typeface="Times New Roman" pitchFamily="18" charset="0"/>
-                <a:cs typeface="Times New Roman" pitchFamily="18" charset="0"/>
+                <a:cs typeface="Arial" pitchFamily="34" charset="0"/>
               </a:rPr>
               <a:t>Collections</a:t>
             </a:r>
             <a:endParaRPr lang="de-AT" sz="1400" dirty="0">
-              <a:latin typeface="Times New Roman" pitchFamily="18" charset="0"/>
-              <a:cs typeface="Times New Roman" pitchFamily="18" charset="0"/>
+              <a:cs typeface="Arial" pitchFamily="34" charset="0"/>
             </a:endParaRPr>
           </a:p>
         </p:txBody>
@@ -3158,7 +3156,7 @@
         </p:nvSpPr>
         <p:spPr>
           <a:xfrm>
-            <a:off x="6660827" y="3377539"/>
+            <a:off x="6660827" y="3355933"/>
             <a:ext cx="1656184" cy="331237"/>
           </a:xfrm>
           <a:prstGeom prst="rect">
@@ -3188,14 +3186,12 @@
             <a:pPr algn="ctr"/>
             <a:r>
               <a:rPr lang="de-AT" sz="1400" dirty="0" smtClean="0">
-                <a:latin typeface="Times New Roman" pitchFamily="18" charset="0"/>
-                <a:cs typeface="Times New Roman" pitchFamily="18" charset="0"/>
+                <a:cs typeface="Arial" pitchFamily="34" charset="0"/>
               </a:rPr>
               <a:t>Persistence</a:t>
             </a:r>
             <a:endParaRPr lang="de-AT" sz="1400" dirty="0">
-              <a:latin typeface="Times New Roman" pitchFamily="18" charset="0"/>
-              <a:cs typeface="Times New Roman" pitchFamily="18" charset="0"/>
+              <a:cs typeface="Arial" pitchFamily="34" charset="0"/>
             </a:endParaRPr>
           </a:p>
         </p:txBody>
@@ -3208,7 +3204,7 @@
         </p:nvSpPr>
         <p:spPr>
           <a:xfrm>
-            <a:off x="8461027" y="3377538"/>
+            <a:off x="8461027" y="3355932"/>
             <a:ext cx="1656184" cy="331237"/>
           </a:xfrm>
           <a:prstGeom prst="rect">
@@ -3238,14 +3234,12 @@
             <a:pPr algn="ctr"/>
             <a:r>
               <a:rPr lang="de-AT" sz="1400" dirty="0" smtClean="0">
-                <a:latin typeface="Times New Roman" pitchFamily="18" charset="0"/>
-                <a:cs typeface="Times New Roman" pitchFamily="18" charset="0"/>
+                <a:cs typeface="Arial" pitchFamily="34" charset="0"/>
               </a:rPr>
               <a:t>MainForm</a:t>
             </a:r>
             <a:endParaRPr lang="de-AT" sz="1400" dirty="0">
-              <a:latin typeface="Times New Roman" pitchFamily="18" charset="0"/>
-              <a:cs typeface="Times New Roman" pitchFamily="18" charset="0"/>
+              <a:cs typeface="Arial" pitchFamily="34" charset="0"/>
             </a:endParaRPr>
           </a:p>
         </p:txBody>
@@ -3258,7 +3252,7 @@
         </p:nvSpPr>
         <p:spPr>
           <a:xfrm>
-            <a:off x="8461027" y="2974294"/>
+            <a:off x="8461027" y="2952688"/>
             <a:ext cx="1656184" cy="331237"/>
           </a:xfrm>
           <a:prstGeom prst="rect">
@@ -3288,14 +3282,12 @@
             <a:pPr algn="ctr"/>
             <a:r>
               <a:rPr lang="de-AT" sz="1400" dirty="0" smtClean="0">
-                <a:latin typeface="Times New Roman" pitchFamily="18" charset="0"/>
-                <a:cs typeface="Times New Roman" pitchFamily="18" charset="0"/>
+                <a:cs typeface="Arial" pitchFamily="34" charset="0"/>
               </a:rPr>
               <a:t>WindowsForms</a:t>
             </a:r>
             <a:endParaRPr lang="de-AT" sz="1400" dirty="0">
-              <a:latin typeface="Times New Roman" pitchFamily="18" charset="0"/>
-              <a:cs typeface="Times New Roman" pitchFamily="18" charset="0"/>
+              <a:cs typeface="Arial" pitchFamily="34" charset="0"/>
             </a:endParaRPr>
           </a:p>
         </p:txBody>
@@ -3338,14 +3330,12 @@
             <a:pPr algn="ctr"/>
             <a:r>
               <a:rPr lang="de-AT" sz="1400" dirty="0" smtClean="0">
-                <a:latin typeface="Times New Roman" pitchFamily="18" charset="0"/>
-                <a:cs typeface="Times New Roman" pitchFamily="18" charset="0"/>
+                <a:cs typeface="Arial" pitchFamily="34" charset="0"/>
               </a:rPr>
               <a:t>Core</a:t>
             </a:r>
             <a:endParaRPr lang="de-AT" sz="1400" dirty="0">
-              <a:latin typeface="Times New Roman" pitchFamily="18" charset="0"/>
-              <a:cs typeface="Times New Roman" pitchFamily="18" charset="0"/>
+              <a:cs typeface="Arial" pitchFamily="34" charset="0"/>
             </a:endParaRPr>
           </a:p>
         </p:txBody>
@@ -3388,14 +3378,12 @@
             <a:pPr algn="ctr"/>
             <a:r>
               <a:rPr lang="de-AT" sz="1400" dirty="0" smtClean="0">
-                <a:latin typeface="Times New Roman" pitchFamily="18" charset="0"/>
-                <a:cs typeface="Times New Roman" pitchFamily="18" charset="0"/>
+                <a:cs typeface="Arial" pitchFamily="34" charset="0"/>
               </a:rPr>
               <a:t>Data</a:t>
             </a:r>
             <a:endParaRPr lang="de-AT" sz="1400" dirty="0">
-              <a:latin typeface="Times New Roman" pitchFamily="18" charset="0"/>
-              <a:cs typeface="Times New Roman" pitchFamily="18" charset="0"/>
+              <a:cs typeface="Arial" pitchFamily="34" charset="0"/>
             </a:endParaRPr>
           </a:p>
         </p:txBody>
@@ -3438,14 +3426,12 @@
             <a:pPr algn="ctr"/>
             <a:r>
               <a:rPr lang="de-AT" sz="1400" dirty="0" smtClean="0">
-                <a:latin typeface="Times New Roman" pitchFamily="18" charset="0"/>
-                <a:cs typeface="Times New Roman" pitchFamily="18" charset="0"/>
+                <a:cs typeface="Arial" pitchFamily="34" charset="0"/>
               </a:rPr>
               <a:t>Parameters</a:t>
             </a:r>
             <a:endParaRPr lang="de-AT" sz="1400" dirty="0">
-              <a:latin typeface="Times New Roman" pitchFamily="18" charset="0"/>
-              <a:cs typeface="Times New Roman" pitchFamily="18" charset="0"/>
+              <a:cs typeface="Arial" pitchFamily="34" charset="0"/>
             </a:endParaRPr>
           </a:p>
         </p:txBody>
@@ -3488,14 +3474,12 @@
             <a:pPr algn="ctr"/>
             <a:r>
               <a:rPr lang="de-AT" sz="1400" dirty="0" smtClean="0">
-                <a:latin typeface="Times New Roman" pitchFamily="18" charset="0"/>
-                <a:cs typeface="Times New Roman" pitchFamily="18" charset="0"/>
+                <a:cs typeface="Arial" pitchFamily="34" charset="0"/>
               </a:rPr>
               <a:t>Operators</a:t>
             </a:r>
             <a:endParaRPr lang="de-AT" sz="1400" dirty="0">
-              <a:latin typeface="Times New Roman" pitchFamily="18" charset="0"/>
-              <a:cs typeface="Times New Roman" pitchFamily="18" charset="0"/>
+              <a:cs typeface="Arial" pitchFamily="34" charset="0"/>
             </a:endParaRPr>
           </a:p>
         </p:txBody>
@@ -3538,14 +3522,12 @@
             <a:pPr algn="ctr"/>
             <a:r>
               <a:rPr lang="de-AT" sz="1400" dirty="0" smtClean="0">
-                <a:latin typeface="Times New Roman" pitchFamily="18" charset="0"/>
-                <a:cs typeface="Times New Roman" pitchFamily="18" charset="0"/>
+                <a:cs typeface="Arial" pitchFamily="34" charset="0"/>
               </a:rPr>
               <a:t>Optimization</a:t>
             </a:r>
             <a:endParaRPr lang="de-AT" sz="1400" dirty="0">
-              <a:latin typeface="Times New Roman" pitchFamily="18" charset="0"/>
-              <a:cs typeface="Times New Roman" pitchFamily="18" charset="0"/>
+              <a:cs typeface="Arial" pitchFamily="34" charset="0"/>
             </a:endParaRPr>
           </a:p>
         </p:txBody>
@@ -3588,14 +3570,18 @@
             <a:pPr algn="ctr"/>
             <a:r>
               <a:rPr lang="de-AT" sz="1400" dirty="0" smtClean="0">
-                <a:latin typeface="Times New Roman" pitchFamily="18" charset="0"/>
-                <a:cs typeface="Times New Roman" pitchFamily="18" charset="0"/>
+                <a:cs typeface="Arial" pitchFamily="34" charset="0"/>
               </a:rPr>
-              <a:t>.*Engine</a:t>
+              <a:t>*</a:t>
+            </a:r>
+            <a:r>
+              <a:rPr lang="de-AT" sz="1400" dirty="0" smtClean="0">
+                <a:cs typeface="Arial" pitchFamily="34" charset="0"/>
+              </a:rPr>
+              <a:t>Engine</a:t>
             </a:r>
             <a:endParaRPr lang="de-AT" sz="1400" dirty="0">
-              <a:latin typeface="Times New Roman" pitchFamily="18" charset="0"/>
-              <a:cs typeface="Times New Roman" pitchFamily="18" charset="0"/>
+              <a:cs typeface="Arial" pitchFamily="34" charset="0"/>
             </a:endParaRPr>
           </a:p>
         </p:txBody>
@@ -3638,14 +3624,12 @@
             <a:pPr algn="ctr"/>
             <a:r>
               <a:rPr lang="de-AT" sz="1400" dirty="0" smtClean="0">
-                <a:latin typeface="Times New Roman" pitchFamily="18" charset="0"/>
-                <a:cs typeface="Times New Roman" pitchFamily="18" charset="0"/>
+                <a:cs typeface="Arial" pitchFamily="34" charset="0"/>
               </a:rPr>
               <a:t>Encodings.*</a:t>
             </a:r>
             <a:endParaRPr lang="de-AT" sz="1400" dirty="0">
-              <a:latin typeface="Times New Roman" pitchFamily="18" charset="0"/>
-              <a:cs typeface="Times New Roman" pitchFamily="18" charset="0"/>
+              <a:cs typeface="Arial" pitchFamily="34" charset="0"/>
             </a:endParaRPr>
           </a:p>
         </p:txBody>
@@ -3688,14 +3672,12 @@
             <a:pPr algn="ctr"/>
             <a:r>
               <a:rPr lang="de-AT" sz="1400" dirty="0" smtClean="0">
-                <a:latin typeface="Times New Roman" pitchFamily="18" charset="0"/>
-                <a:cs typeface="Times New Roman" pitchFamily="18" charset="0"/>
+                <a:cs typeface="Arial" pitchFamily="34" charset="0"/>
               </a:rPr>
               <a:t>Problems.*</a:t>
             </a:r>
             <a:endParaRPr lang="de-AT" sz="1400" dirty="0">
-              <a:latin typeface="Times New Roman" pitchFamily="18" charset="0"/>
-              <a:cs typeface="Times New Roman" pitchFamily="18" charset="0"/>
+              <a:cs typeface="Arial" pitchFamily="34" charset="0"/>
             </a:endParaRPr>
           </a:p>
         </p:txBody>
@@ -3738,14 +3720,12 @@
             <a:pPr algn="ctr"/>
             <a:r>
               <a:rPr lang="de-AT" sz="1400" dirty="0" smtClean="0">
-                <a:latin typeface="Times New Roman" pitchFamily="18" charset="0"/>
-                <a:cs typeface="Times New Roman" pitchFamily="18" charset="0"/>
+                <a:cs typeface="Arial" pitchFamily="34" charset="0"/>
               </a:rPr>
               <a:t>Algorithms.*</a:t>
             </a:r>
             <a:endParaRPr lang="de-AT" sz="1400" dirty="0">
-              <a:latin typeface="Times New Roman" pitchFamily="18" charset="0"/>
-              <a:cs typeface="Times New Roman" pitchFamily="18" charset="0"/>
+              <a:cs typeface="Arial" pitchFamily="34" charset="0"/>
             </a:endParaRPr>
           </a:p>
         </p:txBody>
@@ -3788,14 +3768,12 @@
             <a:pPr algn="ctr"/>
             <a:r>
               <a:rPr lang="de-AT" sz="1400" dirty="0" smtClean="0">
-                <a:latin typeface="Times New Roman" pitchFamily="18" charset="0"/>
-                <a:cs typeface="Times New Roman" pitchFamily="18" charset="0"/>
+                <a:cs typeface="Arial" pitchFamily="34" charset="0"/>
               </a:rPr>
               <a:t>Analysis</a:t>
             </a:r>
             <a:endParaRPr lang="de-AT" sz="1400" dirty="0">
-              <a:latin typeface="Times New Roman" pitchFamily="18" charset="0"/>
-              <a:cs typeface="Times New Roman" pitchFamily="18" charset="0"/>
+              <a:cs typeface="Arial" pitchFamily="34" charset="0"/>
             </a:endParaRPr>
           </a:p>
         </p:txBody>
@@ -3838,14 +3816,12 @@
             <a:pPr algn="ctr"/>
             <a:r>
               <a:rPr lang="de-AT" sz="1400" dirty="0" smtClean="0">
-                <a:latin typeface="Times New Roman" pitchFamily="18" charset="0"/>
-                <a:cs typeface="Times New Roman" pitchFamily="18" charset="0"/>
+                <a:cs typeface="Arial" pitchFamily="34" charset="0"/>
               </a:rPr>
               <a:t>GraphVisualization</a:t>
             </a:r>
             <a:endParaRPr lang="de-AT" sz="1400" dirty="0">
-              <a:latin typeface="Times New Roman" pitchFamily="18" charset="0"/>
-              <a:cs typeface="Times New Roman" pitchFamily="18" charset="0"/>
+              <a:cs typeface="Arial" pitchFamily="34" charset="0"/>
             </a:endParaRPr>
           </a:p>
         </p:txBody>
@@ -3858,7 +3834,7 @@
         </p:nvSpPr>
         <p:spPr>
           <a:xfrm>
-            <a:off x="4938370" y="3377540"/>
+            <a:off x="4938370" y="3355934"/>
             <a:ext cx="1656184" cy="331236"/>
           </a:xfrm>
           <a:prstGeom prst="rect">
@@ -3888,14 +3864,12 @@
             <a:pPr algn="ctr"/>
             <a:r>
               <a:rPr lang="de-AT" sz="1400" dirty="0" smtClean="0">
-                <a:latin typeface="Times New Roman" pitchFamily="18" charset="0"/>
-                <a:cs typeface="Times New Roman" pitchFamily="18" charset="0"/>
+                <a:cs typeface="Arial" pitchFamily="34" charset="0"/>
               </a:rPr>
               <a:t>Tracing/Logging</a:t>
             </a:r>
             <a:endParaRPr lang="de-AT" sz="1400" dirty="0">
-              <a:latin typeface="Times New Roman" pitchFamily="18" charset="0"/>
-              <a:cs typeface="Times New Roman" pitchFamily="18" charset="0"/>
+              <a:cs typeface="Arial" pitchFamily="34" charset="0"/>
             </a:endParaRPr>
           </a:p>
         </p:txBody>
@@ -3938,14 +3912,12 @@
             <a:pPr algn="ctr"/>
             <a:r>
               <a:rPr lang="de-AT" sz="1400" dirty="0" smtClean="0">
-                <a:latin typeface="Times New Roman" pitchFamily="18" charset="0"/>
-                <a:cs typeface="Times New Roman" pitchFamily="18" charset="0"/>
+                <a:cs typeface="Arial" pitchFamily="34" charset="0"/>
               </a:rPr>
               <a:t>Selection</a:t>
             </a:r>
             <a:endParaRPr lang="de-AT" sz="1400" dirty="0">
-              <a:latin typeface="Times New Roman" pitchFamily="18" charset="0"/>
-              <a:cs typeface="Times New Roman" pitchFamily="18" charset="0"/>
+              <a:cs typeface="Arial" pitchFamily="34" charset="0"/>
             </a:endParaRPr>
           </a:p>
         </p:txBody>
@@ -3988,14 +3960,12 @@
             <a:pPr algn="ctr"/>
             <a:r>
               <a:rPr lang="de-AT" sz="1400" dirty="0" smtClean="0">
-                <a:latin typeface="Times New Roman" pitchFamily="18" charset="0"/>
-                <a:cs typeface="Times New Roman" pitchFamily="18" charset="0"/>
+                <a:cs typeface="Arial" pitchFamily="34" charset="0"/>
               </a:rPr>
               <a:t>Random</a:t>
             </a:r>
             <a:endParaRPr lang="de-AT" sz="1400" dirty="0">
-              <a:latin typeface="Times New Roman" pitchFamily="18" charset="0"/>
-              <a:cs typeface="Times New Roman" pitchFamily="18" charset="0"/>
+              <a:cs typeface="Arial" pitchFamily="34" charset="0"/>
             </a:endParaRPr>
           </a:p>
         </p:txBody>
@@ -4038,8 +4008,7 @@
             <a:pPr algn="ctr"/>
             <a:r>
               <a:rPr lang="de-AT" sz="1400" dirty="0">
-                <a:latin typeface="Times New Roman" pitchFamily="18" charset="0"/>
-                <a:cs typeface="Times New Roman" pitchFamily="18" charset="0"/>
+                <a:cs typeface="Arial" pitchFamily="34" charset="0"/>
               </a:rPr>
               <a:t>Instances.*</a:t>
             </a:r>
@@ -4084,14 +4053,12 @@
             <a:pPr algn="ctr"/>
             <a:r>
               <a:rPr lang="de-AT" sz="1400" dirty="0" smtClean="0">
-                <a:latin typeface="Times New Roman" pitchFamily="18" charset="0"/>
-                <a:cs typeface="Times New Roman" pitchFamily="18" charset="0"/>
+                <a:cs typeface="Arial" pitchFamily="34" charset="0"/>
               </a:rPr>
               <a:t>Optimizer</a:t>
             </a:r>
             <a:endParaRPr lang="de-AT" sz="1400" dirty="0">
-              <a:latin typeface="Times New Roman" pitchFamily="18" charset="0"/>
-              <a:cs typeface="Times New Roman" pitchFamily="18" charset="0"/>
+              <a:cs typeface="Arial" pitchFamily="34" charset="0"/>
             </a:endParaRPr>
           </a:p>
         </p:txBody>
@@ -4104,7 +4071,7 @@
         </p:nvSpPr>
         <p:spPr>
           <a:xfrm>
-            <a:off x="10190672" y="3377537"/>
+            <a:off x="10190672" y="3355931"/>
             <a:ext cx="1653668" cy="331237"/>
           </a:xfrm>
           <a:prstGeom prst="rect">
@@ -4134,14 +4101,12 @@
             <a:pPr algn="ctr"/>
             <a:r>
               <a:rPr lang="de-AT" sz="1400" dirty="0" err="1" smtClean="0">
-                <a:latin typeface="Times New Roman" pitchFamily="18" charset="0"/>
-                <a:cs typeface="Times New Roman" pitchFamily="18" charset="0"/>
+                <a:cs typeface="Arial" pitchFamily="34" charset="0"/>
               </a:rPr>
               <a:t>ControlExtensions</a:t>
             </a:r>
             <a:endParaRPr lang="de-AT" sz="1400" dirty="0">
-              <a:latin typeface="Times New Roman" pitchFamily="18" charset="0"/>
-              <a:cs typeface="Times New Roman" pitchFamily="18" charset="0"/>
+              <a:cs typeface="Arial" pitchFamily="34" charset="0"/>
             </a:endParaRPr>
           </a:p>
         </p:txBody>
@@ -4184,8 +4149,7 @@
             <a:pPr algn="ctr"/>
             <a:r>
               <a:rPr lang="de-AT" sz="1400" dirty="0" smtClean="0">
-                <a:latin typeface="Times New Roman" pitchFamily="18" charset="0"/>
-                <a:cs typeface="Times New Roman" pitchFamily="18" charset="0"/>
+                <a:cs typeface="Arial" pitchFamily="34" charset="0"/>
               </a:rPr>
               <a:t>Optimization Operators</a:t>
             </a:r>
@@ -4200,7 +4164,7 @@
         </p:nvSpPr>
         <p:spPr>
           <a:xfrm>
-            <a:off x="1476251" y="3377539"/>
+            <a:off x="1476251" y="3355933"/>
             <a:ext cx="1656184" cy="331237"/>
           </a:xfrm>
           <a:prstGeom prst="rect">
@@ -4230,14 +4194,12 @@
             <a:pPr algn="ctr"/>
             <a:r>
               <a:rPr lang="de-AT" sz="1400" dirty="0" smtClean="0">
-                <a:latin typeface="Times New Roman" pitchFamily="18" charset="0"/>
-                <a:cs typeface="Times New Roman" pitchFamily="18" charset="0"/>
+                <a:cs typeface="Arial" pitchFamily="34" charset="0"/>
               </a:rPr>
               <a:t>Clients.Common</a:t>
             </a:r>
             <a:endParaRPr lang="de-AT" sz="1400" dirty="0">
-              <a:latin typeface="Times New Roman" pitchFamily="18" charset="0"/>
-              <a:cs typeface="Times New Roman" pitchFamily="18" charset="0"/>
+              <a:cs typeface="Arial" pitchFamily="34" charset="0"/>
             </a:endParaRPr>
           </a:p>
         </p:txBody>
@@ -4250,7 +4212,7 @@
         </p:nvSpPr>
         <p:spPr>
           <a:xfrm>
-            <a:off x="10190672" y="2974294"/>
+            <a:off x="10190672" y="2952688"/>
             <a:ext cx="1653668" cy="331237"/>
           </a:xfrm>
           <a:prstGeom prst="rect">
@@ -4280,14 +4242,12 @@
             <a:pPr algn="ctr"/>
             <a:r>
               <a:rPr lang="de-AT" sz="1400" dirty="0" smtClean="0">
-                <a:latin typeface="Times New Roman" pitchFamily="18" charset="0"/>
-                <a:cs typeface="Times New Roman" pitchFamily="18" charset="0"/>
+                <a:cs typeface="Arial" pitchFamily="34" charset="0"/>
               </a:rPr>
               <a:t>CodeEditor</a:t>
             </a:r>
             <a:endParaRPr lang="de-AT" sz="1400" dirty="0">
-              <a:latin typeface="Times New Roman" pitchFamily="18" charset="0"/>
-              <a:cs typeface="Times New Roman" pitchFamily="18" charset="0"/>
+              <a:cs typeface="Arial" pitchFamily="34" charset="0"/>
             </a:endParaRPr>
           </a:p>
         </p:txBody>
@@ -4330,15 +4290,13 @@
             <a:pPr algn="ctr"/>
             <a:r>
               <a:rPr lang="de-AT" sz="1400" dirty="0" err="1">
-                <a:latin typeface="Times New Roman" pitchFamily="18" charset="0"/>
-                <a:cs typeface="Times New Roman" pitchFamily="18" charset="0"/>
+                <a:cs typeface="Arial" pitchFamily="34" charset="0"/>
               </a:rPr>
               <a:t>Programmable</a:t>
             </a:r>
             <a:r>
               <a:rPr lang="de-AT" sz="1400" dirty="0">
-                <a:latin typeface="Times New Roman" pitchFamily="18" charset="0"/>
-                <a:cs typeface="Times New Roman" pitchFamily="18" charset="0"/>
+                <a:cs typeface="Arial" pitchFamily="34" charset="0"/>
               </a:rPr>
               <a:t> Op.</a:t>
             </a:r>
@@ -4353,7 +4311,7 @@
         </p:nvSpPr>
         <p:spPr>
           <a:xfrm>
-            <a:off x="8389019" y="5057181"/>
+            <a:off x="8389019" y="5179591"/>
             <a:ext cx="3456384" cy="307775"/>
           </a:xfrm>
           <a:prstGeom prst="rect">
@@ -4370,14 +4328,12 @@
             <a:pPr algn="ctr"/>
             <a:r>
               <a:rPr lang="de-DE" sz="1400" dirty="0" smtClean="0">
-                <a:latin typeface="Times New Roman" pitchFamily="18" charset="0"/>
-                <a:cs typeface="Times New Roman" pitchFamily="18" charset="0"/>
+                <a:cs typeface="Arial" pitchFamily="34" charset="0"/>
               </a:rPr>
               <a:t>Views</a:t>
             </a:r>
             <a:endParaRPr lang="de-AT" sz="1400" dirty="0">
-              <a:latin typeface="Times New Roman" pitchFamily="18" charset="0"/>
-              <a:cs typeface="Times New Roman" pitchFamily="18" charset="0"/>
+              <a:cs typeface="Arial" pitchFamily="34" charset="0"/>
             </a:endParaRPr>
           </a:p>
         </p:txBody>
@@ -4390,7 +4346,7 @@
         </p:nvSpPr>
         <p:spPr>
           <a:xfrm>
-            <a:off x="1476251" y="5057181"/>
+            <a:off x="1476251" y="5179591"/>
             <a:ext cx="6912768" cy="307775"/>
           </a:xfrm>
           <a:prstGeom prst="rect">
@@ -4407,14 +4363,12 @@
             <a:pPr algn="ctr"/>
             <a:r>
               <a:rPr lang="de-DE" sz="1400" dirty="0" smtClean="0">
-                <a:latin typeface="Times New Roman" pitchFamily="18" charset="0"/>
-                <a:cs typeface="Times New Roman" pitchFamily="18" charset="0"/>
+                <a:cs typeface="Arial" pitchFamily="34" charset="0"/>
               </a:rPr>
               <a:t>Models</a:t>
             </a:r>
             <a:endParaRPr lang="de-AT" sz="1400" dirty="0">
-              <a:latin typeface="Times New Roman" pitchFamily="18" charset="0"/>
-              <a:cs typeface="Times New Roman" pitchFamily="18" charset="0"/>
+              <a:cs typeface="Arial" pitchFamily="34" charset="0"/>
             </a:endParaRPr>
           </a:p>
         </p:txBody>
@@ -4427,8 +4381,8 @@
         </p:nvCxnSpPr>
         <p:spPr>
           <a:xfrm>
-            <a:off x="8389019" y="324396"/>
-            <a:ext cx="0" cy="5040560"/>
+            <a:off x="8389019" y="252388"/>
+            <a:ext cx="0" cy="5194088"/>
           </a:xfrm>
           <a:prstGeom prst="line">
             <a:avLst/>
@@ -4461,7 +4415,7 @@
         </p:nvCxnSpPr>
         <p:spPr>
           <a:xfrm>
-            <a:off x="684163" y="2844676"/>
+            <a:off x="684163" y="2812593"/>
             <a:ext cx="11336773" cy="0"/>
           </a:xfrm>
           <a:prstGeom prst="line">
@@ -4495,7 +4449,7 @@
         </p:nvCxnSpPr>
         <p:spPr>
           <a:xfrm>
-            <a:off x="684163" y="1790176"/>
+            <a:off x="684163" y="1798197"/>
             <a:ext cx="11336773" cy="0"/>
           </a:xfrm>
           <a:prstGeom prst="line">
@@ -4559,14 +4513,12 @@
             <a:pPr algn="ctr"/>
             <a:r>
               <a:rPr lang="de-AT" sz="1400" dirty="0" smtClean="0">
-                <a:latin typeface="Times New Roman" pitchFamily="18" charset="0"/>
-                <a:cs typeface="Times New Roman" pitchFamily="18" charset="0"/>
+                <a:cs typeface="Arial" pitchFamily="34" charset="0"/>
               </a:rPr>
               <a:t>*.Views</a:t>
             </a:r>
             <a:endParaRPr lang="de-AT" sz="1400" dirty="0">
-              <a:latin typeface="Times New Roman" pitchFamily="18" charset="0"/>
-              <a:cs typeface="Times New Roman" pitchFamily="18" charset="0"/>
+              <a:cs typeface="Arial" pitchFamily="34" charset="0"/>
             </a:endParaRPr>
           </a:p>
         </p:txBody>
@@ -4579,8 +4531,8 @@
         </p:nvSpPr>
         <p:spPr>
           <a:xfrm rot="16200000">
-            <a:off x="-89815" y="3762673"/>
-            <a:ext cx="2143767" cy="307775"/>
+            <a:off x="276218" y="3375035"/>
+            <a:ext cx="1411704" cy="307775"/>
           </a:xfrm>
           <a:prstGeom prst="rect">
             <a:avLst/>
@@ -4596,14 +4548,12 @@
             <a:pPr algn="ctr"/>
             <a:r>
               <a:rPr lang="de-DE" sz="1400" dirty="0" smtClean="0">
-                <a:latin typeface="Times New Roman" pitchFamily="18" charset="0"/>
-                <a:cs typeface="Times New Roman" pitchFamily="18" charset="0"/>
+                <a:cs typeface="Arial" pitchFamily="34" charset="0"/>
               </a:rPr>
               <a:t>Base</a:t>
             </a:r>
             <a:endParaRPr lang="de-AT" sz="1400" dirty="0">
-              <a:latin typeface="Times New Roman" pitchFamily="18" charset="0"/>
-              <a:cs typeface="Times New Roman" pitchFamily="18" charset="0"/>
+              <a:cs typeface="Arial" pitchFamily="34" charset="0"/>
             </a:endParaRPr>
           </a:p>
         </p:txBody>
@@ -4616,8 +4566,8 @@
         </p:nvSpPr>
         <p:spPr>
           <a:xfrm rot="16200000">
-            <a:off x="446127" y="2146608"/>
-            <a:ext cx="1071884" cy="307775"/>
+            <a:off x="469635" y="2156746"/>
+            <a:ext cx="1024871" cy="307775"/>
           </a:xfrm>
           <a:prstGeom prst="rect">
             <a:avLst/>
@@ -4633,14 +4583,12 @@
             <a:pPr algn="ctr"/>
             <a:r>
               <a:rPr lang="de-DE" sz="1400" dirty="0" smtClean="0">
-                <a:latin typeface="Times New Roman" pitchFamily="18" charset="0"/>
-                <a:cs typeface="Times New Roman" pitchFamily="18" charset="0"/>
+                <a:cs typeface="Arial" pitchFamily="34" charset="0"/>
               </a:rPr>
               <a:t>Core</a:t>
             </a:r>
             <a:endParaRPr lang="de-AT" sz="1400" dirty="0">
-              <a:latin typeface="Times New Roman" pitchFamily="18" charset="0"/>
-              <a:cs typeface="Times New Roman" pitchFamily="18" charset="0"/>
+              <a:cs typeface="Arial" pitchFamily="34" charset="0"/>
             </a:endParaRPr>
           </a:p>
         </p:txBody>
@@ -4653,8 +4601,8 @@
         </p:nvSpPr>
         <p:spPr>
           <a:xfrm rot="16200000">
-            <a:off x="338118" y="958477"/>
-            <a:ext cx="1287905" cy="307775"/>
+            <a:off x="281176" y="943412"/>
+            <a:ext cx="1401792" cy="307775"/>
           </a:xfrm>
           <a:prstGeom prst="rect">
             <a:avLst/>
@@ -4670,14 +4618,12 @@
             <a:pPr algn="ctr"/>
             <a:r>
               <a:rPr lang="de-DE" sz="1400" dirty="0" err="1" smtClean="0">
-                <a:latin typeface="Times New Roman" pitchFamily="18" charset="0"/>
-                <a:cs typeface="Times New Roman" pitchFamily="18" charset="0"/>
+                <a:cs typeface="Arial" pitchFamily="34" charset="0"/>
               </a:rPr>
               <a:t>Optimization</a:t>
             </a:r>
             <a:endParaRPr lang="de-AT" sz="1400" dirty="0">
-              <a:latin typeface="Times New Roman" pitchFamily="18" charset="0"/>
-              <a:cs typeface="Times New Roman" pitchFamily="18" charset="0"/>
+              <a:cs typeface="Arial" pitchFamily="34" charset="0"/>
             </a:endParaRPr>
           </a:p>
         </p:txBody>
@@ -4690,7 +4636,7 @@
         </p:nvSpPr>
         <p:spPr>
           <a:xfrm>
-            <a:off x="1476251" y="3809587"/>
+            <a:off x="1476251" y="3787981"/>
             <a:ext cx="10369152" cy="331237"/>
           </a:xfrm>
           <a:prstGeom prst="rect">
@@ -4720,14 +4666,30 @@
             <a:pPr algn="ctr"/>
             <a:r>
               <a:rPr lang="de-AT" sz="1400" dirty="0" smtClean="0">
-                <a:latin typeface="Times New Roman" pitchFamily="18" charset="0"/>
-                <a:cs typeface="Times New Roman" pitchFamily="18" charset="0"/>
+                <a:cs typeface="Arial" pitchFamily="34" charset="0"/>
               </a:rPr>
-              <a:t>Common, Resources, and External Libraries</a:t>
+              <a:t>Common, Resources, </a:t>
+            </a:r>
+            <a:r>
+              <a:rPr lang="de-AT" sz="1400" dirty="0" err="1" smtClean="0">
+                <a:cs typeface="Arial" pitchFamily="34" charset="0"/>
+              </a:rPr>
+              <a:t>External</a:t>
+            </a:r>
+            <a:r>
+              <a:rPr lang="de-AT" sz="1400" dirty="0" smtClean="0">
+                <a:cs typeface="Arial" pitchFamily="34" charset="0"/>
+              </a:rPr>
+              <a:t> </a:t>
+            </a:r>
+            <a:r>
+              <a:rPr lang="de-AT" sz="1400" dirty="0" smtClean="0">
+                <a:cs typeface="Arial" pitchFamily="34" charset="0"/>
+              </a:rPr>
+              <a:t>Libraries</a:t>
             </a:r>
             <a:endParaRPr lang="de-AT" sz="1400" dirty="0">
-              <a:latin typeface="Times New Roman" pitchFamily="18" charset="0"/>
-              <a:cs typeface="Times New Roman" pitchFamily="18" charset="0"/>
+              <a:cs typeface="Arial" pitchFamily="34" charset="0"/>
             </a:endParaRPr>
           </a:p>
         </p:txBody>
@@ -4740,12 +4702,24 @@
         </p:nvSpPr>
         <p:spPr>
           <a:xfrm>
-            <a:off x="1476251" y="4225161"/>
+            <a:off x="1476251" y="4347571"/>
             <a:ext cx="10369544" cy="331237"/>
           </a:xfrm>
           <a:prstGeom prst="rect">
             <a:avLst/>
           </a:prstGeom>
+          <a:solidFill>
+            <a:schemeClr val="bg1">
+              <a:lumMod val="85000"/>
+            </a:schemeClr>
+          </a:solidFill>
+          <a:ln>
+            <a:solidFill>
+              <a:schemeClr val="bg1">
+                <a:lumMod val="50000"/>
+              </a:schemeClr>
+            </a:solidFill>
+          </a:ln>
         </p:spPr>
         <p:style>
           <a:lnRef idx="2">
@@ -4770,14 +4744,18 @@
             <a:pPr algn="ctr"/>
             <a:r>
               <a:rPr lang="de-AT" sz="1400" dirty="0" smtClean="0">
-                <a:latin typeface="Times New Roman" pitchFamily="18" charset="0"/>
-                <a:cs typeface="Times New Roman" pitchFamily="18" charset="0"/>
+                <a:solidFill>
+                  <a:schemeClr val="tx1"/>
+                </a:solidFill>
+                <a:cs typeface="Arial" pitchFamily="34" charset="0"/>
               </a:rPr>
               <a:t>PluginInfrastructure</a:t>
             </a:r>
             <a:endParaRPr lang="de-AT" sz="1400" dirty="0">
-              <a:latin typeface="Times New Roman" pitchFamily="18" charset="0"/>
-              <a:cs typeface="Times New Roman" pitchFamily="18" charset="0"/>
+              <a:solidFill>
+                <a:schemeClr val="tx1"/>
+              </a:solidFill>
+              <a:cs typeface="Arial" pitchFamily="34" charset="0"/>
             </a:endParaRPr>
           </a:p>
         </p:txBody>
@@ -4790,17 +4768,24 @@
         </p:nvSpPr>
         <p:spPr>
           <a:xfrm>
-            <a:off x="1476251" y="4657208"/>
+            <a:off x="1476251" y="4779618"/>
             <a:ext cx="10369544" cy="331237"/>
           </a:xfrm>
           <a:prstGeom prst="rect">
             <a:avLst/>
           </a:prstGeom>
-          <a:solidFill>
-            <a:schemeClr val="bg1">
-              <a:lumMod val="85000"/>
-            </a:schemeClr>
-          </a:solidFill>
+          <a:pattFill prst="pct25">
+            <a:fgClr>
+              <a:schemeClr val="bg1">
+                <a:lumMod val="50000"/>
+              </a:schemeClr>
+            </a:fgClr>
+            <a:bgClr>
+              <a:schemeClr val="bg1">
+                <a:lumMod val="85000"/>
+              </a:schemeClr>
+            </a:bgClr>
+          </a:pattFill>
           <a:ln>
             <a:solidFill>
               <a:schemeClr val="bg1">
@@ -4835,17 +4820,15 @@
                 <a:solidFill>
                   <a:schemeClr val="tx1"/>
                 </a:solidFill>
-                <a:latin typeface="Times New Roman" pitchFamily="18" charset="0"/>
-                <a:cs typeface="Times New Roman" pitchFamily="18" charset="0"/>
+                <a:cs typeface="Arial" pitchFamily="34" charset="0"/>
               </a:rPr>
-              <a:t>.Net 4.0</a:t>
+              <a:t>Microsoft .NET 4.0</a:t>
             </a:r>
             <a:endParaRPr lang="de-AT" sz="1400" dirty="0">
               <a:solidFill>
                 <a:schemeClr val="tx1"/>
               </a:solidFill>
-              <a:latin typeface="Times New Roman" pitchFamily="18" charset="0"/>
-              <a:cs typeface="Times New Roman" pitchFamily="18" charset="0"/>
+              <a:cs typeface="Arial" pitchFamily="34" charset="0"/>
             </a:endParaRPr>
           </a:p>
         </p:txBody>
@@ -4891,8 +4874,7 @@
                 <a:solidFill>
                   <a:schemeClr val="tx1"/>
                 </a:solidFill>
-                <a:latin typeface="Times New Roman" pitchFamily="18" charset="0"/>
-                <a:cs typeface="Times New Roman" pitchFamily="18" charset="0"/>
+                <a:cs typeface="Arial" pitchFamily="34" charset="0"/>
               </a:rPr>
               <a:t>Unit Tests</a:t>
             </a:r>
@@ -4900,12 +4882,80 @@
               <a:solidFill>
                 <a:schemeClr val="tx1"/>
               </a:solidFill>
-              <a:latin typeface="Times New Roman" pitchFamily="18" charset="0"/>
-              <a:cs typeface="Times New Roman" pitchFamily="18" charset="0"/>
+              <a:cs typeface="Arial" pitchFamily="34" charset="0"/>
             </a:endParaRPr>
           </a:p>
         </p:txBody>
       </p:sp>
+      <p:sp>
+        <p:nvSpPr>
+          <p:cNvPr id="40" name="Textfeld 39"/>
+          <p:cNvSpPr txBox="1"/>
+          <p:nvPr/>
+        </p:nvSpPr>
+        <p:spPr>
+          <a:xfrm rot="16200000">
+            <a:off x="452987" y="4609973"/>
+            <a:ext cx="1058174" cy="307775"/>
+          </a:xfrm>
+          <a:prstGeom prst="rect">
+            <a:avLst/>
+          </a:prstGeom>
+          <a:noFill/>
+        </p:spPr>
+        <p:txBody>
+          <a:bodyPr wrap="square" lIns="91439" tIns="45719" rIns="91439" bIns="45719" rtlCol="0">
+            <a:spAutoFit/>
+          </a:bodyPr>
+          <a:lstStyle/>
+          <a:p>
+            <a:pPr algn="ctr"/>
+            <a:r>
+              <a:rPr lang="de-DE" sz="1400" dirty="0" err="1" smtClean="0">
+                <a:cs typeface="Arial" pitchFamily="34" charset="0"/>
+              </a:rPr>
+              <a:t>Foundation</a:t>
+            </a:r>
+            <a:endParaRPr lang="de-AT" sz="1400" dirty="0">
+              <a:cs typeface="Arial" pitchFamily="34" charset="0"/>
+            </a:endParaRPr>
+          </a:p>
+        </p:txBody>
+      </p:sp>
+      <p:cxnSp>
+        <p:nvCxnSpPr>
+          <p:cNvPr id="41" name="Gerade Verbindung 35"/>
+          <p:cNvCxnSpPr/>
+          <p:nvPr/>
+        </p:nvCxnSpPr>
+        <p:spPr>
+          <a:xfrm>
+            <a:off x="684163" y="4234775"/>
+            <a:ext cx="11336773" cy="0"/>
+          </a:xfrm>
+          <a:prstGeom prst="line">
+            <a:avLst/>
+          </a:prstGeom>
+          <a:ln>
+            <a:prstDash val="dash"/>
+          </a:ln>
+          <a:effectLst/>
+        </p:spPr>
+        <p:style>
+          <a:lnRef idx="2">
+            <a:schemeClr val="dk1"/>
+          </a:lnRef>
+          <a:fillRef idx="0">
+            <a:schemeClr val="dk1"/>
+          </a:fillRef>
+          <a:effectRef idx="1">
+            <a:schemeClr val="dk1"/>
+          </a:effectRef>
+          <a:fontRef idx="minor">
+            <a:schemeClr val="tx1"/>
+          </a:fontRef>
+        </p:style>
+      </p:cxnSp>
     </p:spTree>
     <p:extLst>
       <p:ext uri="{BB962C8B-B14F-4D97-AF65-F5344CB8AC3E}">

</xml_diff>

<commit_message>
slightly changed architecture block diagram
git-svn-id: https://src.heuristiclab.com/svn/core/trunk@10461 2abd9481-f8db-48e9-bd25-06bc13291c1b
</commit_message>
<xml_diff>
--- a/documentation/HeuristicLab 3.3 - Architecture.pptx
+++ b/documentation/HeuristicLab 3.3 - Architecture.pptx
@@ -104,6 +104,22 @@
       </a:defRPr>
     </a:lvl9pPr>
   </p:defaultTextStyle>
+  <p:extLst>
+    <p:ext uri="{EFAFB233-063F-42B5-8137-9DF3F51BA10A}">
+      <p15:sldGuideLst xmlns:p15="http://schemas.microsoft.com/office/powerpoint/2012/main">
+        <p15:guide id="1" orient="horz" pos="1928">
+          <p15:clr>
+            <a:srgbClr val="A4A3A4"/>
+          </p15:clr>
+        </p15:guide>
+        <p15:guide id="2" pos="3969">
+          <p15:clr>
+            <a:srgbClr val="A4A3A4"/>
+          </p15:clr>
+        </p15:guide>
+      </p15:sldGuideLst>
+    </p:ext>
+  </p:extLst>
 </p:presentation>
 </file>
 
@@ -288,7 +304,7 @@
           <a:p>
             <a:fld id="{17A770FE-B93C-406E-B648-E21175039D10}" type="datetimeFigureOut">
               <a:rPr lang="de-AT" smtClean="0"/>
-              <a:t>28.04.2012</a:t>
+              <a:t>18.02.2014</a:t>
             </a:fld>
             <a:endParaRPr lang="de-AT"/>
           </a:p>
@@ -330,7 +346,7 @@
           <a:p>
             <a:fld id="{8D9144EB-E929-4A40-B56C-0BAF6B5B0A8F}" type="slidenum">
               <a:rPr lang="de-AT" smtClean="0"/>
-              <a:t>‹#›</a:t>
+              <a:t>‹Nr.›</a:t>
             </a:fld>
             <a:endParaRPr lang="de-AT"/>
           </a:p>
@@ -458,7 +474,7 @@
           <a:p>
             <a:fld id="{17A770FE-B93C-406E-B648-E21175039D10}" type="datetimeFigureOut">
               <a:rPr lang="de-AT" smtClean="0"/>
-              <a:t>28.04.2012</a:t>
+              <a:t>18.02.2014</a:t>
             </a:fld>
             <a:endParaRPr lang="de-AT"/>
           </a:p>
@@ -500,7 +516,7 @@
           <a:p>
             <a:fld id="{8D9144EB-E929-4A40-B56C-0BAF6B5B0A8F}" type="slidenum">
               <a:rPr lang="de-AT" smtClean="0"/>
-              <a:t>‹#›</a:t>
+              <a:t>‹Nr.›</a:t>
             </a:fld>
             <a:endParaRPr lang="de-AT"/>
           </a:p>
@@ -638,7 +654,7 @@
           <a:p>
             <a:fld id="{17A770FE-B93C-406E-B648-E21175039D10}" type="datetimeFigureOut">
               <a:rPr lang="de-AT" smtClean="0"/>
-              <a:t>28.04.2012</a:t>
+              <a:t>18.02.2014</a:t>
             </a:fld>
             <a:endParaRPr lang="de-AT"/>
           </a:p>
@@ -680,7 +696,7 @@
           <a:p>
             <a:fld id="{8D9144EB-E929-4A40-B56C-0BAF6B5B0A8F}" type="slidenum">
               <a:rPr lang="de-AT" smtClean="0"/>
-              <a:t>‹#›</a:t>
+              <a:t>‹Nr.›</a:t>
             </a:fld>
             <a:endParaRPr lang="de-AT"/>
           </a:p>
@@ -808,7 +824,7 @@
           <a:p>
             <a:fld id="{17A770FE-B93C-406E-B648-E21175039D10}" type="datetimeFigureOut">
               <a:rPr lang="de-AT" smtClean="0"/>
-              <a:t>28.04.2012</a:t>
+              <a:t>18.02.2014</a:t>
             </a:fld>
             <a:endParaRPr lang="de-AT"/>
           </a:p>
@@ -850,7 +866,7 @@
           <a:p>
             <a:fld id="{8D9144EB-E929-4A40-B56C-0BAF6B5B0A8F}" type="slidenum">
               <a:rPr lang="de-AT" smtClean="0"/>
-              <a:t>‹#›</a:t>
+              <a:t>‹Nr.›</a:t>
             </a:fld>
             <a:endParaRPr lang="de-AT"/>
           </a:p>
@@ -1054,7 +1070,7 @@
           <a:p>
             <a:fld id="{17A770FE-B93C-406E-B648-E21175039D10}" type="datetimeFigureOut">
               <a:rPr lang="de-AT" smtClean="0"/>
-              <a:t>28.04.2012</a:t>
+              <a:t>18.02.2014</a:t>
             </a:fld>
             <a:endParaRPr lang="de-AT"/>
           </a:p>
@@ -1096,7 +1112,7 @@
           <a:p>
             <a:fld id="{8D9144EB-E929-4A40-B56C-0BAF6B5B0A8F}" type="slidenum">
               <a:rPr lang="de-AT" smtClean="0"/>
-              <a:t>‹#›</a:t>
+              <a:t>‹Nr.›</a:t>
             </a:fld>
             <a:endParaRPr lang="de-AT"/>
           </a:p>
@@ -1342,7 +1358,7 @@
           <a:p>
             <a:fld id="{17A770FE-B93C-406E-B648-E21175039D10}" type="datetimeFigureOut">
               <a:rPr lang="de-AT" smtClean="0"/>
-              <a:t>28.04.2012</a:t>
+              <a:t>18.02.2014</a:t>
             </a:fld>
             <a:endParaRPr lang="de-AT"/>
           </a:p>
@@ -1384,7 +1400,7 @@
           <a:p>
             <a:fld id="{8D9144EB-E929-4A40-B56C-0BAF6B5B0A8F}" type="slidenum">
               <a:rPr lang="de-AT" smtClean="0"/>
-              <a:t>‹#›</a:t>
+              <a:t>‹Nr.›</a:t>
             </a:fld>
             <a:endParaRPr lang="de-AT"/>
           </a:p>
@@ -1769,7 +1785,7 @@
           <a:p>
             <a:fld id="{17A770FE-B93C-406E-B648-E21175039D10}" type="datetimeFigureOut">
               <a:rPr lang="de-AT" smtClean="0"/>
-              <a:t>28.04.2012</a:t>
+              <a:t>18.02.2014</a:t>
             </a:fld>
             <a:endParaRPr lang="de-AT"/>
           </a:p>
@@ -1811,7 +1827,7 @@
           <a:p>
             <a:fld id="{8D9144EB-E929-4A40-B56C-0BAF6B5B0A8F}" type="slidenum">
               <a:rPr lang="de-AT" smtClean="0"/>
-              <a:t>‹#›</a:t>
+              <a:t>‹Nr.›</a:t>
             </a:fld>
             <a:endParaRPr lang="de-AT"/>
           </a:p>
@@ -1887,7 +1903,7 @@
           <a:p>
             <a:fld id="{17A770FE-B93C-406E-B648-E21175039D10}" type="datetimeFigureOut">
               <a:rPr lang="de-AT" smtClean="0"/>
-              <a:t>28.04.2012</a:t>
+              <a:t>18.02.2014</a:t>
             </a:fld>
             <a:endParaRPr lang="de-AT"/>
           </a:p>
@@ -1929,7 +1945,7 @@
           <a:p>
             <a:fld id="{8D9144EB-E929-4A40-B56C-0BAF6B5B0A8F}" type="slidenum">
               <a:rPr lang="de-AT" smtClean="0"/>
-              <a:t>‹#›</a:t>
+              <a:t>‹Nr.›</a:t>
             </a:fld>
             <a:endParaRPr lang="de-AT"/>
           </a:p>
@@ -1982,7 +1998,7 @@
           <a:p>
             <a:fld id="{17A770FE-B93C-406E-B648-E21175039D10}" type="datetimeFigureOut">
               <a:rPr lang="de-AT" smtClean="0"/>
-              <a:t>28.04.2012</a:t>
+              <a:t>18.02.2014</a:t>
             </a:fld>
             <a:endParaRPr lang="de-AT"/>
           </a:p>
@@ -2024,7 +2040,7 @@
           <a:p>
             <a:fld id="{8D9144EB-E929-4A40-B56C-0BAF6B5B0A8F}" type="slidenum">
               <a:rPr lang="de-AT" smtClean="0"/>
-              <a:t>‹#›</a:t>
+              <a:t>‹Nr.›</a:t>
             </a:fld>
             <a:endParaRPr lang="de-AT"/>
           </a:p>
@@ -2259,7 +2275,7 @@
           <a:p>
             <a:fld id="{17A770FE-B93C-406E-B648-E21175039D10}" type="datetimeFigureOut">
               <a:rPr lang="de-AT" smtClean="0"/>
-              <a:t>28.04.2012</a:t>
+              <a:t>18.02.2014</a:t>
             </a:fld>
             <a:endParaRPr lang="de-AT"/>
           </a:p>
@@ -2301,7 +2317,7 @@
           <a:p>
             <a:fld id="{8D9144EB-E929-4A40-B56C-0BAF6B5B0A8F}" type="slidenum">
               <a:rPr lang="de-AT" smtClean="0"/>
-              <a:t>‹#›</a:t>
+              <a:t>‹Nr.›</a:t>
             </a:fld>
             <a:endParaRPr lang="de-AT"/>
           </a:p>
@@ -2512,7 +2528,7 @@
           <a:p>
             <a:fld id="{17A770FE-B93C-406E-B648-E21175039D10}" type="datetimeFigureOut">
               <a:rPr lang="de-AT" smtClean="0"/>
-              <a:t>28.04.2012</a:t>
+              <a:t>18.02.2014</a:t>
             </a:fld>
             <a:endParaRPr lang="de-AT"/>
           </a:p>
@@ -2554,7 +2570,7 @@
           <a:p>
             <a:fld id="{8D9144EB-E929-4A40-B56C-0BAF6B5B0A8F}" type="slidenum">
               <a:rPr lang="de-AT" smtClean="0"/>
-              <a:t>‹#›</a:t>
+              <a:t>‹Nr.›</a:t>
             </a:fld>
             <a:endParaRPr lang="de-AT"/>
           </a:p>
@@ -2725,7 +2741,7 @@
           <a:p>
             <a:fld id="{17A770FE-B93C-406E-B648-E21175039D10}" type="datetimeFigureOut">
               <a:rPr lang="de-AT" smtClean="0"/>
-              <a:t>28.04.2012</a:t>
+              <a:t>18.02.2014</a:t>
             </a:fld>
             <a:endParaRPr lang="de-AT"/>
           </a:p>
@@ -2803,7 +2819,7 @@
           <a:p>
             <a:fld id="{8D9144EB-E929-4A40-B56C-0BAF6B5B0A8F}" type="slidenum">
               <a:rPr lang="de-AT" smtClean="0"/>
-              <a:t>‹#›</a:t>
+              <a:t>‹Nr.›</a:t>
             </a:fld>
             <a:endParaRPr lang="de-AT"/>
           </a:p>
@@ -3444,7 +3460,7 @@
         </p:nvSpPr>
         <p:spPr>
           <a:xfrm>
-            <a:off x="3210178" y="1920902"/>
+            <a:off x="4936000" y="1920902"/>
             <a:ext cx="1656184" cy="331237"/>
           </a:xfrm>
           <a:prstGeom prst="rect">
@@ -3572,13 +3588,7 @@
               <a:rPr lang="de-AT" sz="1400" dirty="0" smtClean="0">
                 <a:cs typeface="Arial" pitchFamily="34" charset="0"/>
               </a:rPr>
-              <a:t>*</a:t>
-            </a:r>
-            <a:r>
-              <a:rPr lang="de-AT" sz="1400" dirty="0" smtClean="0">
-                <a:cs typeface="Arial" pitchFamily="34" charset="0"/>
-              </a:rPr>
-              <a:t>Engine</a:t>
+              <a:t>*Engine</a:t>
             </a:r>
             <a:endParaRPr lang="de-AT" sz="1400" dirty="0">
               <a:cs typeface="Arial" pitchFamily="34" charset="0"/>
@@ -4148,11 +4158,14 @@
           <a:p>
             <a:pPr algn="ctr"/>
             <a:r>
-              <a:rPr lang="de-AT" sz="1400" dirty="0" smtClean="0">
+              <a:rPr lang="de-AT" sz="1400" dirty="0" err="1" smtClean="0">
                 <a:cs typeface="Arial" pitchFamily="34" charset="0"/>
               </a:rPr>
-              <a:t>Optimization Operators</a:t>
-            </a:r>
+              <a:t>Optimization.Operators</a:t>
+            </a:r>
+            <a:endParaRPr lang="de-AT" sz="1400" dirty="0" smtClean="0">
+              <a:cs typeface="Arial" pitchFamily="34" charset="0"/>
+            </a:endParaRPr>
           </a:p>
         </p:txBody>
       </p:sp>
@@ -4260,7 +4273,7 @@
         </p:nvSpPr>
         <p:spPr>
           <a:xfrm>
-            <a:off x="4939152" y="1920898"/>
+            <a:off x="3205125" y="1920898"/>
             <a:ext cx="1655402" cy="331241"/>
           </a:xfrm>
           <a:prstGeom prst="rect">
@@ -4680,13 +4693,7 @@
               <a:rPr lang="de-AT" sz="1400" dirty="0" smtClean="0">
                 <a:cs typeface="Arial" pitchFamily="34" charset="0"/>
               </a:rPr>
-              <a:t> </a:t>
-            </a:r>
-            <a:r>
-              <a:rPr lang="de-AT" sz="1400" dirty="0" smtClean="0">
-                <a:cs typeface="Arial" pitchFamily="34" charset="0"/>
-              </a:rPr>
-              <a:t>Libraries</a:t>
+              <a:t> Libraries</a:t>
             </a:r>
             <a:endParaRPr lang="de-AT" sz="1400" dirty="0">
               <a:cs typeface="Arial" pitchFamily="34" charset="0"/>

</xml_diff>

<commit_message>
#2330 - deleted overview slides - updated architecture slides and the tutorials that used that chart
git-svn-id: https://src.heuristiclab.com/svn/core/trunk@12170 2abd9481-f8db-48e9-bd25-06bc13291c1b
</commit_message>
<xml_diff>
--- a/documentation/HeuristicLab 3.3 - Architecture.pptx
+++ b/documentation/HeuristicLab 3.3 - Architecture.pptx
@@ -304,7 +304,7 @@
           <a:p>
             <a:fld id="{17A770FE-B93C-406E-B648-E21175039D10}" type="datetimeFigureOut">
               <a:rPr lang="de-AT" smtClean="0"/>
-              <a:t>18.02.2014</a:t>
+              <a:t>09.03.2015</a:t>
             </a:fld>
             <a:endParaRPr lang="de-AT"/>
           </a:p>
@@ -474,7 +474,7 @@
           <a:p>
             <a:fld id="{17A770FE-B93C-406E-B648-E21175039D10}" type="datetimeFigureOut">
               <a:rPr lang="de-AT" smtClean="0"/>
-              <a:t>18.02.2014</a:t>
+              <a:t>09.03.2015</a:t>
             </a:fld>
             <a:endParaRPr lang="de-AT"/>
           </a:p>
@@ -654,7 +654,7 @@
           <a:p>
             <a:fld id="{17A770FE-B93C-406E-B648-E21175039D10}" type="datetimeFigureOut">
               <a:rPr lang="de-AT" smtClean="0"/>
-              <a:t>18.02.2014</a:t>
+              <a:t>09.03.2015</a:t>
             </a:fld>
             <a:endParaRPr lang="de-AT"/>
           </a:p>
@@ -824,7 +824,7 @@
           <a:p>
             <a:fld id="{17A770FE-B93C-406E-B648-E21175039D10}" type="datetimeFigureOut">
               <a:rPr lang="de-AT" smtClean="0"/>
-              <a:t>18.02.2014</a:t>
+              <a:t>09.03.2015</a:t>
             </a:fld>
             <a:endParaRPr lang="de-AT"/>
           </a:p>
@@ -1070,7 +1070,7 @@
           <a:p>
             <a:fld id="{17A770FE-B93C-406E-B648-E21175039D10}" type="datetimeFigureOut">
               <a:rPr lang="de-AT" smtClean="0"/>
-              <a:t>18.02.2014</a:t>
+              <a:t>09.03.2015</a:t>
             </a:fld>
             <a:endParaRPr lang="de-AT"/>
           </a:p>
@@ -1358,7 +1358,7 @@
           <a:p>
             <a:fld id="{17A770FE-B93C-406E-B648-E21175039D10}" type="datetimeFigureOut">
               <a:rPr lang="de-AT" smtClean="0"/>
-              <a:t>18.02.2014</a:t>
+              <a:t>09.03.2015</a:t>
             </a:fld>
             <a:endParaRPr lang="de-AT"/>
           </a:p>
@@ -1785,7 +1785,7 @@
           <a:p>
             <a:fld id="{17A770FE-B93C-406E-B648-E21175039D10}" type="datetimeFigureOut">
               <a:rPr lang="de-AT" smtClean="0"/>
-              <a:t>18.02.2014</a:t>
+              <a:t>09.03.2015</a:t>
             </a:fld>
             <a:endParaRPr lang="de-AT"/>
           </a:p>
@@ -1903,7 +1903,7 @@
           <a:p>
             <a:fld id="{17A770FE-B93C-406E-B648-E21175039D10}" type="datetimeFigureOut">
               <a:rPr lang="de-AT" smtClean="0"/>
-              <a:t>18.02.2014</a:t>
+              <a:t>09.03.2015</a:t>
             </a:fld>
             <a:endParaRPr lang="de-AT"/>
           </a:p>
@@ -1998,7 +1998,7 @@
           <a:p>
             <a:fld id="{17A770FE-B93C-406E-B648-E21175039D10}" type="datetimeFigureOut">
               <a:rPr lang="de-AT" smtClean="0"/>
-              <a:t>18.02.2014</a:t>
+              <a:t>09.03.2015</a:t>
             </a:fld>
             <a:endParaRPr lang="de-AT"/>
           </a:p>
@@ -2275,7 +2275,7 @@
           <a:p>
             <a:fld id="{17A770FE-B93C-406E-B648-E21175039D10}" type="datetimeFigureOut">
               <a:rPr lang="de-AT" smtClean="0"/>
-              <a:t>18.02.2014</a:t>
+              <a:t>09.03.2015</a:t>
             </a:fld>
             <a:endParaRPr lang="de-AT"/>
           </a:p>
@@ -2528,7 +2528,7 @@
           <a:p>
             <a:fld id="{17A770FE-B93C-406E-B648-E21175039D10}" type="datetimeFigureOut">
               <a:rPr lang="de-AT" smtClean="0"/>
-              <a:t>18.02.2014</a:t>
+              <a:t>09.03.2015</a:t>
             </a:fld>
             <a:endParaRPr lang="de-AT"/>
           </a:p>
@@ -2741,7 +2741,7 @@
           <a:p>
             <a:fld id="{17A770FE-B93C-406E-B648-E21175039D10}" type="datetimeFigureOut">
               <a:rPr lang="de-AT" smtClean="0"/>
-              <a:t>18.02.2014</a:t>
+              <a:t>09.03.2015</a:t>
             </a:fld>
             <a:endParaRPr lang="de-AT"/>
           </a:p>
@@ -3492,7 +3492,7 @@
               <a:rPr lang="de-AT" sz="1400" dirty="0" smtClean="0">
                 <a:cs typeface="Arial" pitchFamily="34" charset="0"/>
               </a:rPr>
-              <a:t>Operators</a:t>
+              <a:t>Operators.*</a:t>
             </a:r>
             <a:endParaRPr lang="de-AT" sz="1400" dirty="0">
               <a:cs typeface="Arial" pitchFamily="34" charset="0"/>
@@ -4302,17 +4302,14 @@
           <a:p>
             <a:pPr algn="ctr"/>
             <a:r>
-              <a:rPr lang="de-AT" sz="1400" dirty="0" err="1">
+              <a:rPr lang="de-AT" sz="1400" dirty="0" smtClean="0">
                 <a:cs typeface="Arial" pitchFamily="34" charset="0"/>
               </a:rPr>
-              <a:t>Programmable</a:t>
-            </a:r>
-            <a:r>
-              <a:rPr lang="de-AT" sz="1400" dirty="0">
-                <a:cs typeface="Arial" pitchFamily="34" charset="0"/>
-              </a:rPr>
-              <a:t> Op.</a:t>
-            </a:r>
+              <a:t>Scripting</a:t>
+            </a:r>
+            <a:endParaRPr lang="de-AT" sz="1400" dirty="0">
+              <a:cs typeface="Arial" pitchFamily="34" charset="0"/>
+            </a:endParaRPr>
           </a:p>
         </p:txBody>
       </p:sp>
@@ -4829,7 +4826,16 @@
                 </a:solidFill>
                 <a:cs typeface="Arial" pitchFamily="34" charset="0"/>
               </a:rPr>
-              <a:t>Microsoft .NET 4.0</a:t>
+              <a:t>Microsoft .NET </a:t>
+            </a:r>
+            <a:r>
+              <a:rPr lang="de-AT" sz="1400" dirty="0" smtClean="0">
+                <a:solidFill>
+                  <a:schemeClr val="tx1"/>
+                </a:solidFill>
+                <a:cs typeface="Arial" pitchFamily="34" charset="0"/>
+              </a:rPr>
+              <a:t>4.5</a:t>
             </a:r>
             <a:endParaRPr lang="de-AT" sz="1400" dirty="0">
               <a:solidFill>

</xml_diff>